<commit_message>
Presentation update and models
</commit_message>
<xml_diff>
--- a/Presentation/TrendsInWeather.pptx
+++ b/Presentation/TrendsInWeather.pptx
@@ -5,7 +5,7 @@
     <p:sldMasterId id="2147483738" r:id="rId1"/>
   </p:sldMasterIdLst>
   <p:notesMasterIdLst>
-    <p:notesMasterId r:id="rId8"/>
+    <p:notesMasterId r:id="rId15"/>
   </p:notesMasterIdLst>
   <p:sldIdLst>
     <p:sldId id="256" r:id="rId2"/>
@@ -14,6 +14,13 @@
     <p:sldId id="259" r:id="rId5"/>
     <p:sldId id="260" r:id="rId6"/>
     <p:sldId id="261" r:id="rId7"/>
+    <p:sldId id="262" r:id="rId8"/>
+    <p:sldId id="263" r:id="rId9"/>
+    <p:sldId id="265" r:id="rId10"/>
+    <p:sldId id="266" r:id="rId11"/>
+    <p:sldId id="267" r:id="rId12"/>
+    <p:sldId id="268" r:id="rId13"/>
+    <p:sldId id="269" r:id="rId14"/>
   </p:sldIdLst>
   <p:sldSz cx="12192000" cy="6858000"/>
   <p:notesSz cx="6858000" cy="9144000"/>
@@ -202,7 +209,7 @@
           <a:p>
             <a:fld id="{16CB96AD-8E3E-4C48-B968-2E2B64B552AA}" type="datetimeFigureOut">
               <a:rPr lang="en-US"/>
-              <a:t>4/24/2015</a:t>
+              <a:t>4/27/2015</a:t>
             </a:fld>
             <a:endParaRPr lang="en-US"/>
           </a:p>
@@ -534,7 +541,7 @@
           <a:p>
             <a:fld id="{EC32774C-B3CD-40FC-91BD-9027A1339214}" type="slidenum">
               <a:rPr lang="en-US"/>
-              <a:t>‹#›</a:t>
+              <a:t>1</a:t>
             </a:fld>
             <a:endParaRPr lang="en-US"/>
           </a:p>
@@ -544,6 +551,342 @@
     <p:extLst>
       <p:ext uri="{BB962C8B-B14F-4D97-AF65-F5344CB8AC3E}">
         <p14:creationId xmlns:p14="http://schemas.microsoft.com/office/powerpoint/2010/main" val="3293634230"/>
+      </p:ext>
+    </p:extLst>
+  </p:cSld>
+  <p:clrMapOvr>
+    <a:masterClrMapping/>
+  </p:clrMapOvr>
+</p:notes>
+</file>
+
+<file path=ppt/notesSlides/notesSlide10.xml><?xml version="1.0" encoding="utf-8"?>
+<p:notes xmlns:a="http://schemas.openxmlformats.org/drawingml/2006/main" xmlns:r="http://schemas.openxmlformats.org/officeDocument/2006/relationships" xmlns:p="http://schemas.openxmlformats.org/presentationml/2006/main">
+  <p:cSld>
+    <p:spTree>
+      <p:nvGrpSpPr>
+        <p:cNvPr id="1" name=""/>
+        <p:cNvGrpSpPr/>
+        <p:nvPr/>
+      </p:nvGrpSpPr>
+      <p:grpSpPr>
+        <a:xfrm>
+          <a:off x="0" y="0"/>
+          <a:ext cx="0" cy="0"/>
+          <a:chOff x="0" y="0"/>
+          <a:chExt cx="0" cy="0"/>
+        </a:xfrm>
+      </p:grpSpPr>
+      <p:sp>
+        <p:nvSpPr>
+          <p:cNvPr id="2" name="Slide Image Placeholder 1"/>
+          <p:cNvSpPr>
+            <a:spLocks noGrp="1" noRot="1" noChangeAspect="1"/>
+          </p:cNvSpPr>
+          <p:nvPr>
+            <p:ph type="sldImg"/>
+          </p:nvPr>
+        </p:nvSpPr>
+        <p:spPr/>
+      </p:sp>
+      <p:sp>
+        <p:nvSpPr>
+          <p:cNvPr id="3" name="Notes Placeholder 2"/>
+          <p:cNvSpPr>
+            <a:spLocks noGrp="1"/>
+          </p:cNvSpPr>
+          <p:nvPr>
+            <p:ph type="body" idx="1"/>
+          </p:nvPr>
+        </p:nvSpPr>
+        <p:spPr/>
+        <p:txBody>
+          <a:bodyPr/>
+          <a:lstStyle/>
+          <a:p>
+            <a:endParaRPr lang="en-US"/>
+          </a:p>
+        </p:txBody>
+      </p:sp>
+      <p:sp>
+        <p:nvSpPr>
+          <p:cNvPr id="4" name="Slide Number Placeholder 3"/>
+          <p:cNvSpPr>
+            <a:spLocks noGrp="1"/>
+          </p:cNvSpPr>
+          <p:nvPr>
+            <p:ph type="sldNum" sz="quarter" idx="10"/>
+          </p:nvPr>
+        </p:nvSpPr>
+        <p:spPr/>
+        <p:txBody>
+          <a:bodyPr/>
+          <a:lstStyle/>
+          <a:p>
+            <a:fld id="{EC32774C-B3CD-40FC-91BD-9027A1339214}" type="slidenum">
+              <a:rPr lang="en-US"/>
+              <a:t>‹#›</a:t>
+            </a:fld>
+            <a:endParaRPr lang="en-US"/>
+          </a:p>
+        </p:txBody>
+      </p:sp>
+    </p:spTree>
+    <p:extLst>
+      <p:ext uri="{BB962C8B-B14F-4D97-AF65-F5344CB8AC3E}">
+        <p14:creationId xmlns:p14="http://schemas.microsoft.com/office/powerpoint/2010/main" val="3974271852"/>
+      </p:ext>
+    </p:extLst>
+  </p:cSld>
+  <p:clrMapOvr>
+    <a:masterClrMapping/>
+  </p:clrMapOvr>
+</p:notes>
+</file>
+
+<file path=ppt/notesSlides/notesSlide11.xml><?xml version="1.0" encoding="utf-8"?>
+<p:notes xmlns:a="http://schemas.openxmlformats.org/drawingml/2006/main" xmlns:r="http://schemas.openxmlformats.org/officeDocument/2006/relationships" xmlns:p="http://schemas.openxmlformats.org/presentationml/2006/main">
+  <p:cSld>
+    <p:spTree>
+      <p:nvGrpSpPr>
+        <p:cNvPr id="1" name=""/>
+        <p:cNvGrpSpPr/>
+        <p:nvPr/>
+      </p:nvGrpSpPr>
+      <p:grpSpPr>
+        <a:xfrm>
+          <a:off x="0" y="0"/>
+          <a:ext cx="0" cy="0"/>
+          <a:chOff x="0" y="0"/>
+          <a:chExt cx="0" cy="0"/>
+        </a:xfrm>
+      </p:grpSpPr>
+      <p:sp>
+        <p:nvSpPr>
+          <p:cNvPr id="2" name="Slide Image Placeholder 1"/>
+          <p:cNvSpPr>
+            <a:spLocks noGrp="1" noRot="1" noChangeAspect="1"/>
+          </p:cNvSpPr>
+          <p:nvPr>
+            <p:ph type="sldImg"/>
+          </p:nvPr>
+        </p:nvSpPr>
+        <p:spPr/>
+      </p:sp>
+      <p:sp>
+        <p:nvSpPr>
+          <p:cNvPr id="3" name="Notes Placeholder 2"/>
+          <p:cNvSpPr>
+            <a:spLocks noGrp="1"/>
+          </p:cNvSpPr>
+          <p:nvPr>
+            <p:ph type="body" idx="1"/>
+          </p:nvPr>
+        </p:nvSpPr>
+        <p:spPr/>
+        <p:txBody>
+          <a:bodyPr/>
+          <a:lstStyle/>
+          <a:p>
+            <a:endParaRPr lang="en-US"/>
+          </a:p>
+        </p:txBody>
+      </p:sp>
+      <p:sp>
+        <p:nvSpPr>
+          <p:cNvPr id="4" name="Slide Number Placeholder 3"/>
+          <p:cNvSpPr>
+            <a:spLocks noGrp="1"/>
+          </p:cNvSpPr>
+          <p:nvPr>
+            <p:ph type="sldNum" sz="quarter" idx="10"/>
+          </p:nvPr>
+        </p:nvSpPr>
+        <p:spPr/>
+        <p:txBody>
+          <a:bodyPr/>
+          <a:lstStyle/>
+          <a:p>
+            <a:fld id="{EC32774C-B3CD-40FC-91BD-9027A1339214}" type="slidenum">
+              <a:rPr lang="en-US"/>
+              <a:t>‹#›</a:t>
+            </a:fld>
+            <a:endParaRPr lang="en-US"/>
+          </a:p>
+        </p:txBody>
+      </p:sp>
+    </p:spTree>
+    <p:extLst>
+      <p:ext uri="{BB962C8B-B14F-4D97-AF65-F5344CB8AC3E}">
+        <p14:creationId xmlns:p14="http://schemas.microsoft.com/office/powerpoint/2010/main" val="1320419356"/>
+      </p:ext>
+    </p:extLst>
+  </p:cSld>
+  <p:clrMapOvr>
+    <a:masterClrMapping/>
+  </p:clrMapOvr>
+</p:notes>
+</file>
+
+<file path=ppt/notesSlides/notesSlide12.xml><?xml version="1.0" encoding="utf-8"?>
+<p:notes xmlns:a="http://schemas.openxmlformats.org/drawingml/2006/main" xmlns:r="http://schemas.openxmlformats.org/officeDocument/2006/relationships" xmlns:p="http://schemas.openxmlformats.org/presentationml/2006/main">
+  <p:cSld>
+    <p:spTree>
+      <p:nvGrpSpPr>
+        <p:cNvPr id="1" name=""/>
+        <p:cNvGrpSpPr/>
+        <p:nvPr/>
+      </p:nvGrpSpPr>
+      <p:grpSpPr>
+        <a:xfrm>
+          <a:off x="0" y="0"/>
+          <a:ext cx="0" cy="0"/>
+          <a:chOff x="0" y="0"/>
+          <a:chExt cx="0" cy="0"/>
+        </a:xfrm>
+      </p:grpSpPr>
+      <p:sp>
+        <p:nvSpPr>
+          <p:cNvPr id="2" name="Slide Image Placeholder 1"/>
+          <p:cNvSpPr>
+            <a:spLocks noGrp="1" noRot="1" noChangeAspect="1"/>
+          </p:cNvSpPr>
+          <p:nvPr>
+            <p:ph type="sldImg"/>
+          </p:nvPr>
+        </p:nvSpPr>
+        <p:spPr/>
+      </p:sp>
+      <p:sp>
+        <p:nvSpPr>
+          <p:cNvPr id="3" name="Notes Placeholder 2"/>
+          <p:cNvSpPr>
+            <a:spLocks noGrp="1"/>
+          </p:cNvSpPr>
+          <p:nvPr>
+            <p:ph type="body" idx="1"/>
+          </p:nvPr>
+        </p:nvSpPr>
+        <p:spPr/>
+        <p:txBody>
+          <a:bodyPr/>
+          <a:lstStyle/>
+          <a:p>
+            <a:endParaRPr lang="en-US"/>
+          </a:p>
+        </p:txBody>
+      </p:sp>
+      <p:sp>
+        <p:nvSpPr>
+          <p:cNvPr id="4" name="Slide Number Placeholder 3"/>
+          <p:cNvSpPr>
+            <a:spLocks noGrp="1"/>
+          </p:cNvSpPr>
+          <p:nvPr>
+            <p:ph type="sldNum" sz="quarter" idx="10"/>
+          </p:nvPr>
+        </p:nvSpPr>
+        <p:spPr/>
+        <p:txBody>
+          <a:bodyPr/>
+          <a:lstStyle/>
+          <a:p>
+            <a:fld id="{EC32774C-B3CD-40FC-91BD-9027A1339214}" type="slidenum">
+              <a:rPr lang="en-US"/>
+              <a:t>‹#›</a:t>
+            </a:fld>
+            <a:endParaRPr lang="en-US"/>
+          </a:p>
+        </p:txBody>
+      </p:sp>
+    </p:spTree>
+    <p:extLst>
+      <p:ext uri="{BB962C8B-B14F-4D97-AF65-F5344CB8AC3E}">
+        <p14:creationId xmlns:p14="http://schemas.microsoft.com/office/powerpoint/2010/main" val="1857240023"/>
+      </p:ext>
+    </p:extLst>
+  </p:cSld>
+  <p:clrMapOvr>
+    <a:masterClrMapping/>
+  </p:clrMapOvr>
+</p:notes>
+</file>
+
+<file path=ppt/notesSlides/notesSlide13.xml><?xml version="1.0" encoding="utf-8"?>
+<p:notes xmlns:a="http://schemas.openxmlformats.org/drawingml/2006/main" xmlns:r="http://schemas.openxmlformats.org/officeDocument/2006/relationships" xmlns:p="http://schemas.openxmlformats.org/presentationml/2006/main">
+  <p:cSld>
+    <p:spTree>
+      <p:nvGrpSpPr>
+        <p:cNvPr id="1" name=""/>
+        <p:cNvGrpSpPr/>
+        <p:nvPr/>
+      </p:nvGrpSpPr>
+      <p:grpSpPr>
+        <a:xfrm>
+          <a:off x="0" y="0"/>
+          <a:ext cx="0" cy="0"/>
+          <a:chOff x="0" y="0"/>
+          <a:chExt cx="0" cy="0"/>
+        </a:xfrm>
+      </p:grpSpPr>
+      <p:sp>
+        <p:nvSpPr>
+          <p:cNvPr id="2" name="Slide Image Placeholder 1"/>
+          <p:cNvSpPr>
+            <a:spLocks noGrp="1" noRot="1" noChangeAspect="1"/>
+          </p:cNvSpPr>
+          <p:nvPr>
+            <p:ph type="sldImg"/>
+          </p:nvPr>
+        </p:nvSpPr>
+        <p:spPr/>
+      </p:sp>
+      <p:sp>
+        <p:nvSpPr>
+          <p:cNvPr id="3" name="Notes Placeholder 2"/>
+          <p:cNvSpPr>
+            <a:spLocks noGrp="1"/>
+          </p:cNvSpPr>
+          <p:nvPr>
+            <p:ph type="body" idx="1"/>
+          </p:nvPr>
+        </p:nvSpPr>
+        <p:spPr/>
+        <p:txBody>
+          <a:bodyPr/>
+          <a:lstStyle/>
+          <a:p>
+            <a:endParaRPr lang="en-US"/>
+          </a:p>
+        </p:txBody>
+      </p:sp>
+      <p:sp>
+        <p:nvSpPr>
+          <p:cNvPr id="4" name="Slide Number Placeholder 3"/>
+          <p:cNvSpPr>
+            <a:spLocks noGrp="1"/>
+          </p:cNvSpPr>
+          <p:nvPr>
+            <p:ph type="sldNum" sz="quarter" idx="10"/>
+          </p:nvPr>
+        </p:nvSpPr>
+        <p:spPr/>
+        <p:txBody>
+          <a:bodyPr/>
+          <a:lstStyle/>
+          <a:p>
+            <a:fld id="{EC32774C-B3CD-40FC-91BD-9027A1339214}" type="slidenum">
+              <a:rPr lang="en-US"/>
+              <a:t>‹#›</a:t>
+            </a:fld>
+            <a:endParaRPr lang="en-US"/>
+          </a:p>
+        </p:txBody>
+      </p:sp>
+    </p:spTree>
+    <p:extLst>
+      <p:ext uri="{BB962C8B-B14F-4D97-AF65-F5344CB8AC3E}">
+        <p14:creationId xmlns:p14="http://schemas.microsoft.com/office/powerpoint/2010/main" val="3895851838"/>
       </p:ext>
     </p:extLst>
   </p:cSld>
@@ -618,7 +961,7 @@
           <a:p>
             <a:fld id="{EC32774C-B3CD-40FC-91BD-9027A1339214}" type="slidenum">
               <a:rPr lang="en-US"/>
-              <a:t>‹#›</a:t>
+              <a:t>2</a:t>
             </a:fld>
             <a:endParaRPr lang="en-US"/>
           </a:p>
@@ -702,7 +1045,7 @@
           <a:p>
             <a:fld id="{EC32774C-B3CD-40FC-91BD-9027A1339214}" type="slidenum">
               <a:rPr lang="en-US"/>
-              <a:t>‹#›</a:t>
+              <a:t>3</a:t>
             </a:fld>
             <a:endParaRPr lang="en-US"/>
           </a:p>
@@ -786,7 +1129,7 @@
           <a:p>
             <a:fld id="{EC32774C-B3CD-40FC-91BD-9027A1339214}" type="slidenum">
               <a:rPr lang="en-US"/>
-              <a:t>‹#›</a:t>
+              <a:t>4</a:t>
             </a:fld>
             <a:endParaRPr lang="en-US"/>
           </a:p>
@@ -870,7 +1213,7 @@
           <a:p>
             <a:fld id="{EC32774C-B3CD-40FC-91BD-9027A1339214}" type="slidenum">
               <a:rPr lang="en-US"/>
-              <a:t>‹#›</a:t>
+              <a:t>5</a:t>
             </a:fld>
             <a:endParaRPr lang="en-US"/>
           </a:p>
@@ -954,7 +1297,7 @@
           <a:p>
             <a:fld id="{EC32774C-B3CD-40FC-91BD-9027A1339214}" type="slidenum">
               <a:rPr lang="en-US"/>
-              <a:t>‹#›</a:t>
+              <a:t>6</a:t>
             </a:fld>
             <a:endParaRPr lang="en-US"/>
           </a:p>
@@ -964,6 +1307,258 @@
     <p:extLst>
       <p:ext uri="{BB962C8B-B14F-4D97-AF65-F5344CB8AC3E}">
         <p14:creationId xmlns:p14="http://schemas.microsoft.com/office/powerpoint/2010/main" val="294790964"/>
+      </p:ext>
+    </p:extLst>
+  </p:cSld>
+  <p:clrMapOvr>
+    <a:masterClrMapping/>
+  </p:clrMapOvr>
+</p:notes>
+</file>
+
+<file path=ppt/notesSlides/notesSlide7.xml><?xml version="1.0" encoding="utf-8"?>
+<p:notes xmlns:a="http://schemas.openxmlformats.org/drawingml/2006/main" xmlns:r="http://schemas.openxmlformats.org/officeDocument/2006/relationships" xmlns:p="http://schemas.openxmlformats.org/presentationml/2006/main">
+  <p:cSld>
+    <p:spTree>
+      <p:nvGrpSpPr>
+        <p:cNvPr id="1" name=""/>
+        <p:cNvGrpSpPr/>
+        <p:nvPr/>
+      </p:nvGrpSpPr>
+      <p:grpSpPr>
+        <a:xfrm>
+          <a:off x="0" y="0"/>
+          <a:ext cx="0" cy="0"/>
+          <a:chOff x="0" y="0"/>
+          <a:chExt cx="0" cy="0"/>
+        </a:xfrm>
+      </p:grpSpPr>
+      <p:sp>
+        <p:nvSpPr>
+          <p:cNvPr id="2" name="Slide Image Placeholder 1"/>
+          <p:cNvSpPr>
+            <a:spLocks noGrp="1" noRot="1" noChangeAspect="1"/>
+          </p:cNvSpPr>
+          <p:nvPr>
+            <p:ph type="sldImg"/>
+          </p:nvPr>
+        </p:nvSpPr>
+        <p:spPr/>
+      </p:sp>
+      <p:sp>
+        <p:nvSpPr>
+          <p:cNvPr id="3" name="Notes Placeholder 2"/>
+          <p:cNvSpPr>
+            <a:spLocks noGrp="1"/>
+          </p:cNvSpPr>
+          <p:nvPr>
+            <p:ph type="body" idx="1"/>
+          </p:nvPr>
+        </p:nvSpPr>
+        <p:spPr/>
+        <p:txBody>
+          <a:bodyPr/>
+          <a:lstStyle/>
+          <a:p>
+            <a:endParaRPr lang="en-US"/>
+          </a:p>
+        </p:txBody>
+      </p:sp>
+      <p:sp>
+        <p:nvSpPr>
+          <p:cNvPr id="4" name="Slide Number Placeholder 3"/>
+          <p:cNvSpPr>
+            <a:spLocks noGrp="1"/>
+          </p:cNvSpPr>
+          <p:nvPr>
+            <p:ph type="sldNum" sz="quarter" idx="10"/>
+          </p:nvPr>
+        </p:nvSpPr>
+        <p:spPr/>
+        <p:txBody>
+          <a:bodyPr/>
+          <a:lstStyle/>
+          <a:p>
+            <a:fld id="{EC32774C-B3CD-40FC-91BD-9027A1339214}" type="slidenum">
+              <a:rPr lang="en-US"/>
+              <a:t>‹#›</a:t>
+            </a:fld>
+            <a:endParaRPr lang="en-US"/>
+          </a:p>
+        </p:txBody>
+      </p:sp>
+    </p:spTree>
+    <p:extLst>
+      <p:ext uri="{BB962C8B-B14F-4D97-AF65-F5344CB8AC3E}">
+        <p14:creationId xmlns:p14="http://schemas.microsoft.com/office/powerpoint/2010/main" val="543491052"/>
+      </p:ext>
+    </p:extLst>
+  </p:cSld>
+  <p:clrMapOvr>
+    <a:masterClrMapping/>
+  </p:clrMapOvr>
+</p:notes>
+</file>
+
+<file path=ppt/notesSlides/notesSlide8.xml><?xml version="1.0" encoding="utf-8"?>
+<p:notes xmlns:a="http://schemas.openxmlformats.org/drawingml/2006/main" xmlns:r="http://schemas.openxmlformats.org/officeDocument/2006/relationships" xmlns:p="http://schemas.openxmlformats.org/presentationml/2006/main">
+  <p:cSld>
+    <p:spTree>
+      <p:nvGrpSpPr>
+        <p:cNvPr id="1" name=""/>
+        <p:cNvGrpSpPr/>
+        <p:nvPr/>
+      </p:nvGrpSpPr>
+      <p:grpSpPr>
+        <a:xfrm>
+          <a:off x="0" y="0"/>
+          <a:ext cx="0" cy="0"/>
+          <a:chOff x="0" y="0"/>
+          <a:chExt cx="0" cy="0"/>
+        </a:xfrm>
+      </p:grpSpPr>
+      <p:sp>
+        <p:nvSpPr>
+          <p:cNvPr id="2" name="Slide Image Placeholder 1"/>
+          <p:cNvSpPr>
+            <a:spLocks noGrp="1" noRot="1" noChangeAspect="1"/>
+          </p:cNvSpPr>
+          <p:nvPr>
+            <p:ph type="sldImg"/>
+          </p:nvPr>
+        </p:nvSpPr>
+        <p:spPr/>
+      </p:sp>
+      <p:sp>
+        <p:nvSpPr>
+          <p:cNvPr id="3" name="Notes Placeholder 2"/>
+          <p:cNvSpPr>
+            <a:spLocks noGrp="1"/>
+          </p:cNvSpPr>
+          <p:nvPr>
+            <p:ph type="body" idx="1"/>
+          </p:nvPr>
+        </p:nvSpPr>
+        <p:spPr/>
+        <p:txBody>
+          <a:bodyPr/>
+          <a:lstStyle/>
+          <a:p>
+            <a:endParaRPr lang="en-US"/>
+          </a:p>
+        </p:txBody>
+      </p:sp>
+      <p:sp>
+        <p:nvSpPr>
+          <p:cNvPr id="4" name="Slide Number Placeholder 3"/>
+          <p:cNvSpPr>
+            <a:spLocks noGrp="1"/>
+          </p:cNvSpPr>
+          <p:nvPr>
+            <p:ph type="sldNum" sz="quarter" idx="10"/>
+          </p:nvPr>
+        </p:nvSpPr>
+        <p:spPr/>
+        <p:txBody>
+          <a:bodyPr/>
+          <a:lstStyle/>
+          <a:p>
+            <a:fld id="{EC32774C-B3CD-40FC-91BD-9027A1339214}" type="slidenum">
+              <a:rPr lang="en-US"/>
+              <a:t>‹#›</a:t>
+            </a:fld>
+            <a:endParaRPr lang="en-US"/>
+          </a:p>
+        </p:txBody>
+      </p:sp>
+    </p:spTree>
+    <p:extLst>
+      <p:ext uri="{BB962C8B-B14F-4D97-AF65-F5344CB8AC3E}">
+        <p14:creationId xmlns:p14="http://schemas.microsoft.com/office/powerpoint/2010/main" val="2590455651"/>
+      </p:ext>
+    </p:extLst>
+  </p:cSld>
+  <p:clrMapOvr>
+    <a:masterClrMapping/>
+  </p:clrMapOvr>
+</p:notes>
+</file>
+
+<file path=ppt/notesSlides/notesSlide9.xml><?xml version="1.0" encoding="utf-8"?>
+<p:notes xmlns:a="http://schemas.openxmlformats.org/drawingml/2006/main" xmlns:r="http://schemas.openxmlformats.org/officeDocument/2006/relationships" xmlns:p="http://schemas.openxmlformats.org/presentationml/2006/main">
+  <p:cSld>
+    <p:spTree>
+      <p:nvGrpSpPr>
+        <p:cNvPr id="1" name=""/>
+        <p:cNvGrpSpPr/>
+        <p:nvPr/>
+      </p:nvGrpSpPr>
+      <p:grpSpPr>
+        <a:xfrm>
+          <a:off x="0" y="0"/>
+          <a:ext cx="0" cy="0"/>
+          <a:chOff x="0" y="0"/>
+          <a:chExt cx="0" cy="0"/>
+        </a:xfrm>
+      </p:grpSpPr>
+      <p:sp>
+        <p:nvSpPr>
+          <p:cNvPr id="2" name="Slide Image Placeholder 1"/>
+          <p:cNvSpPr>
+            <a:spLocks noGrp="1" noRot="1" noChangeAspect="1"/>
+          </p:cNvSpPr>
+          <p:nvPr>
+            <p:ph type="sldImg"/>
+          </p:nvPr>
+        </p:nvSpPr>
+        <p:spPr/>
+      </p:sp>
+      <p:sp>
+        <p:nvSpPr>
+          <p:cNvPr id="3" name="Notes Placeholder 2"/>
+          <p:cNvSpPr>
+            <a:spLocks noGrp="1"/>
+          </p:cNvSpPr>
+          <p:nvPr>
+            <p:ph type="body" idx="1"/>
+          </p:nvPr>
+        </p:nvSpPr>
+        <p:spPr/>
+        <p:txBody>
+          <a:bodyPr/>
+          <a:lstStyle/>
+          <a:p>
+            <a:endParaRPr lang="en-US"/>
+          </a:p>
+        </p:txBody>
+      </p:sp>
+      <p:sp>
+        <p:nvSpPr>
+          <p:cNvPr id="4" name="Slide Number Placeholder 3"/>
+          <p:cNvSpPr>
+            <a:spLocks noGrp="1"/>
+          </p:cNvSpPr>
+          <p:nvPr>
+            <p:ph type="sldNum" sz="quarter" idx="10"/>
+          </p:nvPr>
+        </p:nvSpPr>
+        <p:spPr/>
+        <p:txBody>
+          <a:bodyPr/>
+          <a:lstStyle/>
+          <a:p>
+            <a:fld id="{EC32774C-B3CD-40FC-91BD-9027A1339214}" type="slidenum">
+              <a:rPr lang="en-US"/>
+              <a:t>‹#›</a:t>
+            </a:fld>
+            <a:endParaRPr lang="en-US"/>
+          </a:p>
+        </p:txBody>
+      </p:sp>
+    </p:spTree>
+    <p:extLst>
+      <p:ext uri="{BB962C8B-B14F-4D97-AF65-F5344CB8AC3E}">
+        <p14:creationId xmlns:p14="http://schemas.microsoft.com/office/powerpoint/2010/main" val="922050181"/>
       </p:ext>
     </p:extLst>
   </p:cSld>
@@ -1154,7 +1749,7 @@
           <a:p>
             <a:fld id="{F1FA7AC5-6045-4418-8E60-F48788734473}" type="datetimeFigureOut">
               <a:rPr lang="en-US" smtClean="0"/>
-              <a:t>4/24/2015</a:t>
+              <a:t>4/27/2015</a:t>
             </a:fld>
             <a:endParaRPr lang="en-US"/>
           </a:p>
@@ -1427,7 +2022,7 @@
           <a:p>
             <a:fld id="{F1FA7AC5-6045-4418-8E60-F48788734473}" type="datetimeFigureOut">
               <a:rPr lang="en-US" smtClean="0"/>
-              <a:t>4/24/2015</a:t>
+              <a:t>4/27/2015</a:t>
             </a:fld>
             <a:endParaRPr lang="en-US"/>
           </a:p>
@@ -1620,7 +2215,7 @@
           <a:p>
             <a:fld id="{F1FA7AC5-6045-4418-8E60-F48788734473}" type="datetimeFigureOut">
               <a:rPr lang="en-US" smtClean="0"/>
-              <a:t>4/24/2015</a:t>
+              <a:t>4/27/2015</a:t>
             </a:fld>
             <a:endParaRPr lang="en-US"/>
           </a:p>
@@ -1887,7 +2482,7 @@
           <a:p>
             <a:fld id="{F1FA7AC5-6045-4418-8E60-F48788734473}" type="datetimeFigureOut">
               <a:rPr lang="en-US" smtClean="0"/>
-              <a:t>4/24/2015</a:t>
+              <a:t>4/27/2015</a:t>
             </a:fld>
             <a:endParaRPr lang="en-US"/>
           </a:p>
@@ -2218,7 +2813,7 @@
           <a:p>
             <a:fld id="{F1FA7AC5-6045-4418-8E60-F48788734473}" type="datetimeFigureOut">
               <a:rPr lang="en-US" smtClean="0"/>
-              <a:t>4/24/2015</a:t>
+              <a:t>4/27/2015</a:t>
             </a:fld>
             <a:endParaRPr lang="en-US"/>
           </a:p>
@@ -2827,7 +3422,7 @@
           <a:p>
             <a:fld id="{F1FA7AC5-6045-4418-8E60-F48788734473}" type="datetimeFigureOut">
               <a:rPr lang="en-US" smtClean="0"/>
-              <a:t>4/24/2015</a:t>
+              <a:t>4/27/2015</a:t>
             </a:fld>
             <a:endParaRPr lang="en-US"/>
           </a:p>
@@ -3670,7 +4265,7 @@
           <a:p>
             <a:fld id="{F1FA7AC5-6045-4418-8E60-F48788734473}" type="datetimeFigureOut">
               <a:rPr lang="en-US" smtClean="0"/>
-              <a:t>4/24/2015</a:t>
+              <a:t>4/27/2015</a:t>
             </a:fld>
             <a:endParaRPr lang="en-US"/>
           </a:p>
@@ -3838,7 +4433,7 @@
           <a:p>
             <a:fld id="{F1FA7AC5-6045-4418-8E60-F48788734473}" type="datetimeFigureOut">
               <a:rPr lang="en-US" smtClean="0"/>
-              <a:t>4/24/2015</a:t>
+              <a:t>4/27/2015</a:t>
             </a:fld>
             <a:endParaRPr lang="en-US"/>
           </a:p>
@@ -4016,7 +4611,7 @@
           <a:p>
             <a:fld id="{F1FA7AC5-6045-4418-8E60-F48788734473}" type="datetimeFigureOut">
               <a:rPr lang="en-US" smtClean="0"/>
-              <a:t>4/24/2015</a:t>
+              <a:t>4/27/2015</a:t>
             </a:fld>
             <a:endParaRPr lang="en-US"/>
           </a:p>
@@ -4184,7 +4779,7 @@
           <a:p>
             <a:fld id="{F1FA7AC5-6045-4418-8E60-F48788734473}" type="datetimeFigureOut">
               <a:rPr lang="en-US" smtClean="0"/>
-              <a:t>4/24/2015</a:t>
+              <a:t>4/27/2015</a:t>
             </a:fld>
             <a:endParaRPr lang="en-US"/>
           </a:p>
@@ -4427,7 +5022,7 @@
           <a:p>
             <a:fld id="{F1FA7AC5-6045-4418-8E60-F48788734473}" type="datetimeFigureOut">
               <a:rPr lang="en-US" smtClean="0"/>
-              <a:t>4/24/2015</a:t>
+              <a:t>4/27/2015</a:t>
             </a:fld>
             <a:endParaRPr lang="en-US"/>
           </a:p>
@@ -4716,7 +5311,7 @@
           <a:p>
             <a:fld id="{F1FA7AC5-6045-4418-8E60-F48788734473}" type="datetimeFigureOut">
               <a:rPr lang="en-US" smtClean="0"/>
-              <a:t>4/24/2015</a:t>
+              <a:t>4/27/2015</a:t>
             </a:fld>
             <a:endParaRPr lang="en-US"/>
           </a:p>
@@ -5151,7 +5746,7 @@
           <a:p>
             <a:fld id="{F1FA7AC5-6045-4418-8E60-F48788734473}" type="datetimeFigureOut">
               <a:rPr lang="en-US" smtClean="0"/>
-              <a:t>4/24/2015</a:t>
+              <a:t>4/27/2015</a:t>
             </a:fld>
             <a:endParaRPr lang="en-US"/>
           </a:p>
@@ -5268,7 +5863,7 @@
           <a:p>
             <a:fld id="{F1FA7AC5-6045-4418-8E60-F48788734473}" type="datetimeFigureOut">
               <a:rPr lang="en-US" smtClean="0"/>
-              <a:t>4/24/2015</a:t>
+              <a:t>4/27/2015</a:t>
             </a:fld>
             <a:endParaRPr lang="en-US"/>
           </a:p>
@@ -5363,7 +5958,7 @@
           <a:p>
             <a:fld id="{F1FA7AC5-6045-4418-8E60-F48788734473}" type="datetimeFigureOut">
               <a:rPr lang="en-US" smtClean="0"/>
-              <a:t>4/24/2015</a:t>
+              <a:t>4/27/2015</a:t>
             </a:fld>
             <a:endParaRPr lang="en-US"/>
           </a:p>
@@ -5640,7 +6235,7 @@
           <a:p>
             <a:fld id="{F1FA7AC5-6045-4418-8E60-F48788734473}" type="datetimeFigureOut">
               <a:rPr lang="en-US" smtClean="0"/>
-              <a:t>4/24/2015</a:t>
+              <a:t>4/27/2015</a:t>
             </a:fld>
             <a:endParaRPr lang="en-US"/>
           </a:p>
@@ -5913,7 +6508,7 @@
           <a:p>
             <a:fld id="{F1FA7AC5-6045-4418-8E60-F48788734473}" type="datetimeFigureOut">
               <a:rPr lang="en-US" smtClean="0"/>
-              <a:t>4/24/2015</a:t>
+              <a:t>4/27/2015</a:t>
             </a:fld>
             <a:endParaRPr lang="en-US"/>
           </a:p>
@@ -6340,7 +6935,7 @@
           <a:p>
             <a:fld id="{F1FA7AC5-6045-4418-8E60-F48788734473}" type="datetimeFigureOut">
               <a:rPr lang="en-US" smtClean="0"/>
-              <a:t>4/24/2015</a:t>
+              <a:t>4/27/2015</a:t>
             </a:fld>
             <a:endParaRPr lang="en-US"/>
           </a:p>
@@ -6914,6 +7509,426 @@
 </p:sld>
 </file>
 
+<file path=ppt/slides/slide10.xml><?xml version="1.0" encoding="utf-8"?>
+<p:sld xmlns:a="http://schemas.openxmlformats.org/drawingml/2006/main" xmlns:r="http://schemas.openxmlformats.org/officeDocument/2006/relationships" xmlns:p="http://schemas.openxmlformats.org/presentationml/2006/main">
+  <p:cSld>
+    <p:spTree>
+      <p:nvGrpSpPr>
+        <p:cNvPr id="1" name=""/>
+        <p:cNvGrpSpPr/>
+        <p:nvPr/>
+      </p:nvGrpSpPr>
+      <p:grpSpPr>
+        <a:xfrm>
+          <a:off x="0" y="0"/>
+          <a:ext cx="0" cy="0"/>
+          <a:chOff x="0" y="0"/>
+          <a:chExt cx="0" cy="0"/>
+        </a:xfrm>
+      </p:grpSpPr>
+      <p:sp>
+        <p:nvSpPr>
+          <p:cNvPr id="2" name="Title 1"/>
+          <p:cNvSpPr>
+            <a:spLocks noGrp="1"/>
+          </p:cNvSpPr>
+          <p:nvPr>
+            <p:ph type="title"/>
+          </p:nvPr>
+        </p:nvSpPr>
+        <p:spPr/>
+        <p:txBody>
+          <a:bodyPr/>
+          <a:lstStyle/>
+          <a:p>
+            <a:r>
+              <a:rPr lang="en-US" sz="2400"/>
+              <a:t>TX 2013</a:t>
+            </a:r>
+            <a:br>
+              <a:rPr lang="en-US" sz="2400"/>
+            </a:br>
+            <a:r>
+              <a:rPr lang="en-US" sz="2400"/>
+              <a:t>Maximum AVG Temp: ~83</a:t>
+            </a:r>
+            <a:br>
+              <a:rPr lang="en-US" sz="2400"/>
+            </a:br>
+            <a:r>
+              <a:rPr lang="en-US" sz="2400"/>
+              <a:t>Minimum AVG Temp: ~45</a:t>
+            </a:r>
+          </a:p>
+        </p:txBody>
+      </p:sp>
+      <p:pic>
+        <p:nvPicPr>
+          <p:cNvPr id="4" name="Content Placeholder 3" descr="TX2013.png"/>
+          <p:cNvPicPr>
+            <a:picLocks noGrp="1" noChangeAspect="1"/>
+          </p:cNvPicPr>
+          <p:nvPr>
+            <p:ph idx="1"/>
+          </p:nvPr>
+        </p:nvPicPr>
+        <p:blipFill>
+          <a:blip r:embed="rId3"/>
+          <a:stretch>
+            <a:fillRect/>
+          </a:stretch>
+        </p:blipFill>
+        <p:spPr>
+          <a:xfrm>
+            <a:off x="314308" y="1777345"/>
+            <a:ext cx="11497002" cy="4661095"/>
+          </a:xfrm>
+        </p:spPr>
+      </p:pic>
+    </p:spTree>
+    <p:extLst>
+      <p:ext uri="{BB962C8B-B14F-4D97-AF65-F5344CB8AC3E}">
+        <p14:creationId xmlns:p14="http://schemas.microsoft.com/office/powerpoint/2010/main" val="1837025172"/>
+      </p:ext>
+    </p:extLst>
+  </p:cSld>
+  <p:clrMapOvr>
+    <a:masterClrMapping/>
+  </p:clrMapOvr>
+</p:sld>
+</file>
+
+<file path=ppt/slides/slide11.xml><?xml version="1.0" encoding="utf-8"?>
+<p:sld xmlns:a="http://schemas.openxmlformats.org/drawingml/2006/main" xmlns:r="http://schemas.openxmlformats.org/officeDocument/2006/relationships" xmlns:p="http://schemas.openxmlformats.org/presentationml/2006/main">
+  <p:cSld>
+    <p:spTree>
+      <p:nvGrpSpPr>
+        <p:cNvPr id="1" name=""/>
+        <p:cNvGrpSpPr/>
+        <p:nvPr/>
+      </p:nvGrpSpPr>
+      <p:grpSpPr>
+        <a:xfrm>
+          <a:off x="0" y="0"/>
+          <a:ext cx="0" cy="0"/>
+          <a:chOff x="0" y="0"/>
+          <a:chExt cx="0" cy="0"/>
+        </a:xfrm>
+      </p:grpSpPr>
+      <p:sp>
+        <p:nvSpPr>
+          <p:cNvPr id="2" name="Title 1"/>
+          <p:cNvSpPr>
+            <a:spLocks noGrp="1"/>
+          </p:cNvSpPr>
+          <p:nvPr>
+            <p:ph type="title"/>
+          </p:nvPr>
+        </p:nvSpPr>
+        <p:spPr/>
+        <p:txBody>
+          <a:bodyPr/>
+          <a:lstStyle/>
+          <a:p>
+            <a:r>
+              <a:rPr lang="en-US"/>
+              <a:t>Precipitation</a:t>
+            </a:r>
+          </a:p>
+        </p:txBody>
+      </p:sp>
+      <p:sp>
+        <p:nvSpPr>
+          <p:cNvPr id="3" name="Content Placeholder 2"/>
+          <p:cNvSpPr>
+            <a:spLocks noGrp="1"/>
+          </p:cNvSpPr>
+          <p:nvPr>
+            <p:ph idx="1"/>
+          </p:nvPr>
+        </p:nvSpPr>
+        <p:spPr>
+          <a:xfrm>
+            <a:off x="1075133" y="1452295"/>
+            <a:ext cx="8946541" cy="4195481"/>
+          </a:xfrm>
+        </p:spPr>
+        <p:txBody>
+          <a:bodyPr vert="horz" lIns="91440" tIns="45720" rIns="91440" bIns="45720" rtlCol="0" anchor="t">
+            <a:normAutofit/>
+          </a:bodyPr>
+          <a:lstStyle/>
+          <a:p>
+            <a:r>
+              <a:rPr lang="en-US" sz="1600"/>
+              <a:t>Precipitation was an interesting indicator because the precipitation spikes usually linked to a Hurricane, Tsunami, or other major thunderstorm</a:t>
+            </a:r>
+          </a:p>
+          <a:p>
+            <a:r>
+              <a:rPr lang="en-US" sz="1600"/>
+              <a:t>Below is a graph of the precipitation of Florida, which is very susceptible to thunderstorms</a:t>
+            </a:r>
+          </a:p>
+        </p:txBody>
+      </p:sp>
+      <p:pic>
+        <p:nvPicPr>
+          <p:cNvPr id="4" name="Picture 3" descr="FL_Precip.png"/>
+          <p:cNvPicPr>
+            <a:picLocks noChangeAspect="1"/>
+          </p:cNvPicPr>
+          <p:nvPr/>
+        </p:nvPicPr>
+        <p:blipFill>
+          <a:blip r:embed="rId3"/>
+          <a:stretch>
+            <a:fillRect/>
+          </a:stretch>
+        </p:blipFill>
+        <p:spPr>
+          <a:xfrm>
+            <a:off x="976629" y="2581629"/>
+            <a:ext cx="10272284" cy="4170645"/>
+          </a:xfrm>
+          <a:prstGeom prst="rect">
+            <a:avLst/>
+          </a:prstGeom>
+        </p:spPr>
+      </p:pic>
+    </p:spTree>
+    <p:extLst>
+      <p:ext uri="{BB962C8B-B14F-4D97-AF65-F5344CB8AC3E}">
+        <p14:creationId xmlns:p14="http://schemas.microsoft.com/office/powerpoint/2010/main" val="1322720798"/>
+      </p:ext>
+    </p:extLst>
+  </p:cSld>
+  <p:clrMapOvr>
+    <a:masterClrMapping/>
+  </p:clrMapOvr>
+</p:sld>
+</file>
+
+<file path=ppt/slides/slide12.xml><?xml version="1.0" encoding="utf-8"?>
+<p:sld xmlns:a="http://schemas.openxmlformats.org/drawingml/2006/main" xmlns:r="http://schemas.openxmlformats.org/officeDocument/2006/relationships" xmlns:p="http://schemas.openxmlformats.org/presentationml/2006/main">
+  <p:cSld>
+    <p:spTree>
+      <p:nvGrpSpPr>
+        <p:cNvPr id="1" name=""/>
+        <p:cNvGrpSpPr/>
+        <p:nvPr/>
+      </p:nvGrpSpPr>
+      <p:grpSpPr>
+        <a:xfrm>
+          <a:off x="0" y="0"/>
+          <a:ext cx="0" cy="0"/>
+          <a:chOff x="0" y="0"/>
+          <a:chExt cx="0" cy="0"/>
+        </a:xfrm>
+      </p:grpSpPr>
+      <p:sp>
+        <p:nvSpPr>
+          <p:cNvPr id="2" name="Title 1"/>
+          <p:cNvSpPr>
+            <a:spLocks noGrp="1"/>
+          </p:cNvSpPr>
+          <p:nvPr>
+            <p:ph type="title"/>
+          </p:nvPr>
+        </p:nvSpPr>
+        <p:spPr/>
+        <p:txBody>
+          <a:bodyPr/>
+          <a:lstStyle/>
+          <a:p>
+            <a:r>
+              <a:rPr lang="en-US"/>
+              <a:t>Florida August 2008</a:t>
+            </a:r>
+          </a:p>
+        </p:txBody>
+      </p:sp>
+      <p:sp>
+        <p:nvSpPr>
+          <p:cNvPr id="3" name="Content Placeholder 2"/>
+          <p:cNvSpPr>
+            <a:spLocks noGrp="1"/>
+          </p:cNvSpPr>
+          <p:nvPr>
+            <p:ph idx="1"/>
+          </p:nvPr>
+        </p:nvSpPr>
+        <p:spPr>
+          <a:xfrm>
+            <a:off x="736988" y="1404696"/>
+            <a:ext cx="8946541" cy="4195481"/>
+          </a:xfrm>
+        </p:spPr>
+        <p:txBody>
+          <a:bodyPr vert="horz" lIns="91440" tIns="45720" rIns="91440" bIns="45720" rtlCol="0" anchor="t">
+            <a:normAutofit/>
+          </a:bodyPr>
+          <a:lstStyle/>
+          <a:p>
+            <a:r>
+              <a:rPr lang="en-US"/>
+              <a:t>Tropical Storm Fay (2008)</a:t>
+            </a:r>
+          </a:p>
+        </p:txBody>
+      </p:sp>
+      <p:pic>
+        <p:nvPicPr>
+          <p:cNvPr id="4" name="Picture 3" descr="FL_AUG2008.png"/>
+          <p:cNvPicPr>
+            <a:picLocks noChangeAspect="1"/>
+          </p:cNvPicPr>
+          <p:nvPr/>
+        </p:nvPicPr>
+        <p:blipFill>
+          <a:blip r:embed="rId3"/>
+          <a:stretch>
+            <a:fillRect/>
+          </a:stretch>
+        </p:blipFill>
+        <p:spPr>
+          <a:xfrm>
+            <a:off x="586313" y="2168916"/>
+            <a:ext cx="10851788" cy="4415968"/>
+          </a:xfrm>
+          <a:prstGeom prst="rect">
+            <a:avLst/>
+          </a:prstGeom>
+        </p:spPr>
+      </p:pic>
+    </p:spTree>
+    <p:extLst>
+      <p:ext uri="{BB962C8B-B14F-4D97-AF65-F5344CB8AC3E}">
+        <p14:creationId xmlns:p14="http://schemas.microsoft.com/office/powerpoint/2010/main" val="3409877921"/>
+      </p:ext>
+    </p:extLst>
+  </p:cSld>
+  <p:clrMapOvr>
+    <a:masterClrMapping/>
+  </p:clrMapOvr>
+</p:sld>
+</file>
+
+<file path=ppt/slides/slide13.xml><?xml version="1.0" encoding="utf-8"?>
+<p:sld xmlns:a="http://schemas.openxmlformats.org/drawingml/2006/main" xmlns:r="http://schemas.openxmlformats.org/officeDocument/2006/relationships" xmlns:p="http://schemas.openxmlformats.org/presentationml/2006/main">
+  <p:cSld>
+    <p:spTree>
+      <p:nvGrpSpPr>
+        <p:cNvPr id="1" name=""/>
+        <p:cNvGrpSpPr/>
+        <p:nvPr/>
+      </p:nvGrpSpPr>
+      <p:grpSpPr>
+        <a:xfrm>
+          <a:off x="0" y="0"/>
+          <a:ext cx="0" cy="0"/>
+          <a:chOff x="0" y="0"/>
+          <a:chExt cx="0" cy="0"/>
+        </a:xfrm>
+      </p:grpSpPr>
+      <p:sp>
+        <p:nvSpPr>
+          <p:cNvPr id="2" name="Title 1"/>
+          <p:cNvSpPr>
+            <a:spLocks noGrp="1"/>
+          </p:cNvSpPr>
+          <p:nvPr>
+            <p:ph type="title"/>
+          </p:nvPr>
+        </p:nvSpPr>
+        <p:spPr/>
+        <p:txBody>
+          <a:bodyPr/>
+          <a:lstStyle/>
+          <a:p>
+            <a:r>
+              <a:rPr lang="en-US"/>
+              <a:t>Florida (2012)</a:t>
+            </a:r>
+          </a:p>
+        </p:txBody>
+      </p:sp>
+      <p:sp>
+        <p:nvSpPr>
+          <p:cNvPr id="3" name="Content Placeholder 2"/>
+          <p:cNvSpPr>
+            <a:spLocks noGrp="1"/>
+          </p:cNvSpPr>
+          <p:nvPr>
+            <p:ph idx="1"/>
+          </p:nvPr>
+        </p:nvSpPr>
+        <p:spPr>
+          <a:xfrm>
+            <a:off x="646111" y="1479852"/>
+            <a:ext cx="8946541" cy="4195481"/>
+          </a:xfrm>
+        </p:spPr>
+        <p:txBody>
+          <a:bodyPr vert="horz" lIns="91440" tIns="45720" rIns="91440" bIns="45720" rtlCol="0" anchor="t">
+            <a:normAutofit/>
+          </a:bodyPr>
+          <a:lstStyle/>
+          <a:p>
+            <a:r>
+              <a:rPr lang="en-US"/>
+              <a:t>Tropical Storm Beryl (May 2012), Hurricane Isaac (</a:t>
+            </a:r>
+            <a:r>
+              <a:rPr lang="en-US" dirty="0">
+                <a:latin typeface="Century Gothic" charset="0"/>
+              </a:rPr>
+              <a:t>August </a:t>
+            </a:r>
+            <a:r>
+              <a:rPr lang="en-US"/>
+              <a:t>2012)</a:t>
+            </a:r>
+          </a:p>
+        </p:txBody>
+      </p:sp>
+      <p:pic>
+        <p:nvPicPr>
+          <p:cNvPr id="4" name="Picture 3" descr="FloridaMay2012.png"/>
+          <p:cNvPicPr>
+            <a:picLocks noChangeAspect="1"/>
+          </p:cNvPicPr>
+          <p:nvPr/>
+        </p:nvPicPr>
+        <p:blipFill>
+          <a:blip r:embed="rId3"/>
+          <a:stretch>
+            <a:fillRect/>
+          </a:stretch>
+        </p:blipFill>
+        <p:spPr>
+          <a:xfrm>
+            <a:off x="276225" y="2204691"/>
+            <a:ext cx="11041206" cy="4485034"/>
+          </a:xfrm>
+          <a:prstGeom prst="rect">
+            <a:avLst/>
+          </a:prstGeom>
+        </p:spPr>
+      </p:pic>
+    </p:spTree>
+    <p:extLst>
+      <p:ext uri="{BB962C8B-B14F-4D97-AF65-F5344CB8AC3E}">
+        <p14:creationId xmlns:p14="http://schemas.microsoft.com/office/powerpoint/2010/main" val="1794465375"/>
+      </p:ext>
+    </p:extLst>
+  </p:cSld>
+  <p:clrMapOvr>
+    <a:masterClrMapping/>
+  </p:clrMapOvr>
+</p:sld>
+</file>
+
 <file path=ppt/slides/slide2.xml><?xml version="1.0" encoding="utf-8"?>
 <p:sld xmlns:a="http://schemas.openxmlformats.org/drawingml/2006/main" xmlns:r="http://schemas.openxmlformats.org/officeDocument/2006/relationships" xmlns:p="http://schemas.openxmlformats.org/presentationml/2006/main">
   <p:cSld>
@@ -7529,6 +8544,360 @@
     <p:extLst>
       <p:ext uri="{BB962C8B-B14F-4D97-AF65-F5344CB8AC3E}">
         <p14:creationId xmlns:p14="http://schemas.microsoft.com/office/powerpoint/2010/main" val="2809215004"/>
+      </p:ext>
+    </p:extLst>
+  </p:cSld>
+  <p:clrMapOvr>
+    <a:masterClrMapping/>
+  </p:clrMapOvr>
+</p:sld>
+</file>
+
+<file path=ppt/slides/slide7.xml><?xml version="1.0" encoding="utf-8"?>
+<p:sld xmlns:a="http://schemas.openxmlformats.org/drawingml/2006/main" xmlns:r="http://schemas.openxmlformats.org/officeDocument/2006/relationships" xmlns:p="http://schemas.openxmlformats.org/presentationml/2006/main">
+  <p:cSld>
+    <p:spTree>
+      <p:nvGrpSpPr>
+        <p:cNvPr id="1" name=""/>
+        <p:cNvGrpSpPr/>
+        <p:nvPr/>
+      </p:nvGrpSpPr>
+      <p:grpSpPr>
+        <a:xfrm>
+          <a:off x="0" y="0"/>
+          <a:ext cx="0" cy="0"/>
+          <a:chOff x="0" y="0"/>
+          <a:chExt cx="0" cy="0"/>
+        </a:xfrm>
+      </p:grpSpPr>
+      <p:sp>
+        <p:nvSpPr>
+          <p:cNvPr id="2" name="Title 1"/>
+          <p:cNvSpPr>
+            <a:spLocks noGrp="1"/>
+          </p:cNvSpPr>
+          <p:nvPr>
+            <p:ph type="title"/>
+          </p:nvPr>
+        </p:nvSpPr>
+        <p:spPr/>
+        <p:txBody>
+          <a:bodyPr/>
+          <a:lstStyle/>
+          <a:p>
+            <a:r>
+              <a:rPr lang="en-US"/>
+              <a:t>Time Series Analysis</a:t>
+            </a:r>
+          </a:p>
+        </p:txBody>
+      </p:sp>
+      <p:sp>
+        <p:nvSpPr>
+          <p:cNvPr id="3" name="Content Placeholder 2"/>
+          <p:cNvSpPr>
+            <a:spLocks noGrp="1"/>
+          </p:cNvSpPr>
+          <p:nvPr>
+            <p:ph idx="1"/>
+          </p:nvPr>
+        </p:nvSpPr>
+        <p:spPr/>
+        <p:txBody>
+          <a:bodyPr vert="horz" lIns="91440" tIns="45720" rIns="91440" bIns="45720" rtlCol="0" anchor="t">
+            <a:normAutofit/>
+          </a:bodyPr>
+          <a:lstStyle/>
+          <a:p>
+            <a:r>
+              <a:rPr lang="en-US" b="1" dirty="0">
+                <a:latin typeface="Century Gothic" charset="0"/>
+              </a:rPr>
+              <a:t>The process of using statistical techniques to model and explain a time-dependent series of data points. </a:t>
+            </a:r>
+          </a:p>
+          <a:p>
+            <a:r>
+              <a:rPr lang="en-US"/>
+              <a:t>Time series: A sequence of data points, </a:t>
+            </a:r>
+            <a:r>
+              <a:rPr lang="en-US">
+                <a:solidFill>
+                  <a:srgbClr val="FFFFFF"/>
+                </a:solidFill>
+                <a:latin typeface="Century Gothic" charset="0"/>
+              </a:rPr>
+              <a:t>typically consisting of successive measurements made over a time interval </a:t>
+            </a:r>
+          </a:p>
+          <a:p>
+            <a:r>
+              <a:rPr lang="en-US">
+                <a:solidFill>
+                  <a:srgbClr val="FFFFFF"/>
+                </a:solidFill>
+                <a:latin typeface="Century Gothic" charset="0"/>
+              </a:rPr>
+              <a:t>Exactly what is needed for finding trends and predicting future patterns in temperature and precipitation</a:t>
+            </a:r>
+          </a:p>
+          <a:p>
+            <a:pPr lvl="1"/>
+            <a:r>
+              <a:rPr lang="en-US" sz="2000">
+                <a:solidFill>
+                  <a:srgbClr val="FFFFFF"/>
+                </a:solidFill>
+                <a:latin typeface="Century Gothic" charset="0"/>
+              </a:rPr>
+              <a:t>Equally spaced out data points</a:t>
+            </a:r>
+          </a:p>
+          <a:p>
+            <a:pPr lvl="1"/>
+            <a:r>
+              <a:rPr lang="en-US" sz="2000">
+                <a:solidFill>
+                  <a:srgbClr val="FFFFFF"/>
+                </a:solidFill>
+                <a:latin typeface="Century Gothic" charset="0"/>
+              </a:rPr>
+              <a:t>Continuous, real values dependent on time</a:t>
+            </a:r>
+            <a:endParaRPr lang="en-US">
+              <a:solidFill>
+                <a:srgbClr val="FFFFFF"/>
+              </a:solidFill>
+              <a:latin typeface="Century Gothic" charset="0"/>
+            </a:endParaRPr>
+          </a:p>
+        </p:txBody>
+      </p:sp>
+    </p:spTree>
+    <p:extLst>
+      <p:ext uri="{BB962C8B-B14F-4D97-AF65-F5344CB8AC3E}">
+        <p14:creationId xmlns:p14="http://schemas.microsoft.com/office/powerpoint/2010/main" val="3202779363"/>
+      </p:ext>
+    </p:extLst>
+  </p:cSld>
+  <p:clrMapOvr>
+    <a:masterClrMapping/>
+  </p:clrMapOvr>
+</p:sld>
+</file>
+
+<file path=ppt/slides/slide8.xml><?xml version="1.0" encoding="utf-8"?>
+<p:sld xmlns:a="http://schemas.openxmlformats.org/drawingml/2006/main" xmlns:r="http://schemas.openxmlformats.org/officeDocument/2006/relationships" xmlns:p="http://schemas.openxmlformats.org/presentationml/2006/main">
+  <p:cSld>
+    <p:spTree>
+      <p:nvGrpSpPr>
+        <p:cNvPr id="1" name=""/>
+        <p:cNvGrpSpPr/>
+        <p:nvPr/>
+      </p:nvGrpSpPr>
+      <p:grpSpPr>
+        <a:xfrm>
+          <a:off x="0" y="0"/>
+          <a:ext cx="0" cy="0"/>
+          <a:chOff x="0" y="0"/>
+          <a:chExt cx="0" cy="0"/>
+        </a:xfrm>
+      </p:grpSpPr>
+      <p:sp>
+        <p:nvSpPr>
+          <p:cNvPr id="2" name="Title 1"/>
+          <p:cNvSpPr>
+            <a:spLocks noGrp="1"/>
+          </p:cNvSpPr>
+          <p:nvPr>
+            <p:ph type="title"/>
+          </p:nvPr>
+        </p:nvSpPr>
+        <p:spPr/>
+        <p:txBody>
+          <a:bodyPr/>
+          <a:lstStyle/>
+          <a:p>
+            <a:r>
+              <a:rPr lang="en-US"/>
+              <a:t>Applying Time Series</a:t>
+            </a:r>
+          </a:p>
+        </p:txBody>
+      </p:sp>
+      <p:sp>
+        <p:nvSpPr>
+          <p:cNvPr id="3" name="Content Placeholder 2"/>
+          <p:cNvSpPr>
+            <a:spLocks noGrp="1"/>
+          </p:cNvSpPr>
+          <p:nvPr>
+            <p:ph idx="1"/>
+          </p:nvPr>
+        </p:nvSpPr>
+        <p:spPr/>
+        <p:txBody>
+          <a:bodyPr vert="horz" lIns="91440" tIns="45720" rIns="91440" bIns="45720" rtlCol="0" anchor="t">
+            <a:normAutofit/>
+          </a:bodyPr>
+          <a:lstStyle/>
+          <a:p>
+            <a:r>
+              <a:rPr lang="en-US"/>
+              <a:t>For our project, we first generated all the appropriate .arff files ready to be analyzed with the Weka forecast tool</a:t>
+            </a:r>
+          </a:p>
+          <a:p>
+            <a:r>
+              <a:rPr lang="en-US"/>
+              <a:t>We first looked at temperatures</a:t>
+            </a:r>
+          </a:p>
+          <a:p>
+            <a:pPr lvl="1"/>
+            <a:r>
+              <a:rPr lang="en-US" sz="2000"/>
+              <a:t>Very natural and consistent pattern</a:t>
+            </a:r>
+          </a:p>
+          <a:p>
+            <a:pPr lvl="1"/>
+            <a:r>
+              <a:rPr lang="en-US" sz="2000"/>
+              <a:t>Follows seasonal patterns as one would expect</a:t>
+            </a:r>
+          </a:p>
+          <a:p>
+            <a:pPr lvl="2"/>
+            <a:r>
+              <a:rPr lang="en-US" sz="2000"/>
+              <a:t>Not a significant increase if any in temperature over time</a:t>
+            </a:r>
+          </a:p>
+          <a:p>
+            <a:pPr lvl="2"/>
+            <a:r>
+              <a:rPr lang="en-US" sz="2000"/>
+              <a:t>Glacial data probably would be a better indicator for warming</a:t>
+            </a:r>
+          </a:p>
+          <a:p>
+            <a:pPr lvl="1"/>
+            <a:r>
+              <a:rPr lang="en-US" sz="2000"/>
+              <a:t>Though did give insight on the differences in temperature across different regions of the United States</a:t>
+            </a:r>
+          </a:p>
+        </p:txBody>
+      </p:sp>
+    </p:spTree>
+    <p:extLst>
+      <p:ext uri="{BB962C8B-B14F-4D97-AF65-F5344CB8AC3E}">
+        <p14:creationId xmlns:p14="http://schemas.microsoft.com/office/powerpoint/2010/main" val="3417124731"/>
+      </p:ext>
+    </p:extLst>
+  </p:cSld>
+  <p:clrMapOvr>
+    <a:masterClrMapping/>
+  </p:clrMapOvr>
+</p:sld>
+</file>
+
+<file path=ppt/slides/slide9.xml><?xml version="1.0" encoding="utf-8"?>
+<p:sld xmlns:a="http://schemas.openxmlformats.org/drawingml/2006/main" xmlns:r="http://schemas.openxmlformats.org/officeDocument/2006/relationships" xmlns:p="http://schemas.openxmlformats.org/presentationml/2006/main">
+  <p:cSld>
+    <p:spTree>
+      <p:nvGrpSpPr>
+        <p:cNvPr id="1" name=""/>
+        <p:cNvGrpSpPr/>
+        <p:nvPr/>
+      </p:nvGrpSpPr>
+      <p:grpSpPr>
+        <a:xfrm>
+          <a:off x="0" y="0"/>
+          <a:ext cx="0" cy="0"/>
+          <a:chOff x="0" y="0"/>
+          <a:chExt cx="0" cy="0"/>
+        </a:xfrm>
+      </p:grpSpPr>
+      <p:sp>
+        <p:nvSpPr>
+          <p:cNvPr id="2" name="Title 1"/>
+          <p:cNvSpPr>
+            <a:spLocks noGrp="1"/>
+          </p:cNvSpPr>
+          <p:nvPr>
+            <p:ph type="title"/>
+          </p:nvPr>
+        </p:nvSpPr>
+        <p:spPr/>
+        <p:txBody>
+          <a:bodyPr/>
+          <a:lstStyle/>
+          <a:p>
+            <a:r>
+              <a:rPr lang="en-US" sz="2400"/>
+              <a:t>NY 2013, </a:t>
+            </a:r>
+            <a:r>
+              <a:rPr lang="en-US" sz="2400" dirty="0"/>
+              <a:t/>
+            </a:r>
+            <a:br>
+              <a:rPr lang="en-US" sz="2400" dirty="0"/>
+            </a:br>
+            <a:r>
+              <a:rPr lang="en-US" sz="2400"/>
+              <a:t>Maximum AVG Temp: ~73</a:t>
+            </a:r>
+            <a:r>
+              <a:rPr lang="en-US" sz="2400" dirty="0"/>
+              <a:t/>
+            </a:r>
+            <a:br>
+              <a:rPr lang="en-US" sz="2400" dirty="0"/>
+            </a:br>
+            <a:r>
+              <a:rPr lang="en-US" sz="2400">
+                <a:solidFill>
+                  <a:srgbClr val="EBEBEB"/>
+                </a:solidFill>
+                <a:latin typeface="Century Gothic"/>
+              </a:rPr>
+              <a:t>Minimum AVG Temp: ~17.5</a:t>
+            </a:r>
+          </a:p>
+        </p:txBody>
+      </p:sp>
+      <p:pic>
+        <p:nvPicPr>
+          <p:cNvPr id="4" name="Picture 3" descr="NY2013.png"/>
+          <p:cNvPicPr>
+            <a:picLocks noChangeAspect="1"/>
+          </p:cNvPicPr>
+          <p:nvPr/>
+        </p:nvPicPr>
+        <p:blipFill>
+          <a:blip r:embed="rId3"/>
+          <a:stretch>
+            <a:fillRect/>
+          </a:stretch>
+        </p:blipFill>
+        <p:spPr>
+          <a:xfrm>
+            <a:off x="272411" y="1662830"/>
+            <a:ext cx="11485702" cy="4662944"/>
+          </a:xfrm>
+          <a:prstGeom prst="rect">
+            <a:avLst/>
+          </a:prstGeom>
+        </p:spPr>
+      </p:pic>
+    </p:spTree>
+    <p:extLst>
+      <p:ext uri="{BB962C8B-B14F-4D97-AF65-F5344CB8AC3E}">
+        <p14:creationId xmlns:p14="http://schemas.microsoft.com/office/powerpoint/2010/main" val="2846495977"/>
       </p:ext>
     </p:extLst>
   </p:cSld>

</xml_diff>